<commit_message>
Resuming project added documentation.
</commit_message>
<xml_diff>
--- a/documentation/fc idea presentation.pptx
+++ b/documentation/fc idea presentation.pptx
@@ -3350,7 +3350,7 @@
         <p:spPr>
           <a:xfrm>
             <a:off x="504000" y="1524960"/>
-            <a:ext cx="9070560" cy="1261440"/>
+            <a:ext cx="9070200" cy="1261080"/>
           </a:xfrm>
           <a:prstGeom prst="rect">
             <a:avLst/>
@@ -3401,7 +3401,7 @@
         <p:spPr>
           <a:xfrm>
             <a:off x="504000" y="3024000"/>
-            <a:ext cx="9070560" cy="2768400"/>
+            <a:ext cx="9070200" cy="2768040"/>
           </a:xfrm>
           <a:prstGeom prst="rect">
             <a:avLst/>
@@ -3497,7 +3497,7 @@
         <p:spPr>
           <a:xfrm>
             <a:off x="504000" y="300960"/>
-            <a:ext cx="9070560" cy="1261440"/>
+            <a:ext cx="9070200" cy="1261080"/>
           </a:xfrm>
           <a:prstGeom prst="rect">
             <a:avLst/>
@@ -3548,7 +3548,7 @@
         <p:spPr>
           <a:xfrm>
             <a:off x="504000" y="1768680"/>
-            <a:ext cx="9070560" cy="4383360"/>
+            <a:ext cx="9070200" cy="4383000"/>
           </a:xfrm>
           <a:prstGeom prst="rect">
             <a:avLst/>
@@ -3569,7 +3569,7 @@
             <a:normAutofit fontScale="91000"/>
           </a:bodyPr>
           <a:p>
-            <a:pPr marL="432000" indent="-322920">
+            <a:pPr marL="432000" indent="-322560">
               <a:lnSpc>
                 <a:spcPct val="100000"/>
               </a:lnSpc>
@@ -3611,7 +3611,7 @@
             </a:endParaRPr>
           </a:p>
           <a:p>
-            <a:pPr marL="432000" indent="-322920">
+            <a:pPr marL="432000" indent="-322560">
               <a:lnSpc>
                 <a:spcPct val="100000"/>
               </a:lnSpc>
@@ -3653,7 +3653,7 @@
             </a:endParaRPr>
           </a:p>
           <a:p>
-            <a:pPr marL="432000" indent="-322920">
+            <a:pPr marL="432000" indent="-322560">
               <a:lnSpc>
                 <a:spcPct val="100000"/>
               </a:lnSpc>
@@ -3695,7 +3695,7 @@
             </a:endParaRPr>
           </a:p>
           <a:p>
-            <a:pPr marL="432000" indent="-322920">
+            <a:pPr marL="432000" indent="-322560">
               <a:lnSpc>
                 <a:spcPct val="100000"/>
               </a:lnSpc>
@@ -3734,7 +3734,7 @@
         <p:spPr>
           <a:xfrm>
             <a:off x="0" y="6768000"/>
-            <a:ext cx="4966920" cy="790920"/>
+            <a:ext cx="4966560" cy="790560"/>
           </a:xfrm>
           <a:prstGeom prst="rect">
             <a:avLst/>
@@ -3785,7 +3785,7 @@
         <p:spPr>
           <a:xfrm>
             <a:off x="5112000" y="6768000"/>
-            <a:ext cx="4966920" cy="790920"/>
+            <a:ext cx="4966560" cy="790560"/>
           </a:xfrm>
           <a:prstGeom prst="rect">
             <a:avLst/>
@@ -3885,7 +3885,7 @@
         <p:spPr>
           <a:xfrm>
             <a:off x="6017040" y="1872000"/>
-            <a:ext cx="3534120" cy="3526920"/>
+            <a:ext cx="3533760" cy="3526560"/>
           </a:xfrm>
           <a:prstGeom prst="rect">
             <a:avLst/>
@@ -3908,7 +3908,7 @@
         <p:spPr>
           <a:xfrm>
             <a:off x="6031440" y="1872000"/>
-            <a:ext cx="3505320" cy="3526920"/>
+            <a:ext cx="3504960" cy="3526560"/>
           </a:xfrm>
           <a:prstGeom prst="rect">
             <a:avLst/>
@@ -3931,7 +3931,7 @@
         <p:spPr>
           <a:xfrm>
             <a:off x="6020640" y="1872000"/>
-            <a:ext cx="3526920" cy="3526920"/>
+            <a:ext cx="3526560" cy="3526560"/>
           </a:xfrm>
           <a:prstGeom prst="rect">
             <a:avLst/>
@@ -3954,7 +3954,7 @@
         <p:spPr>
           <a:xfrm>
             <a:off x="6027840" y="1872000"/>
-            <a:ext cx="3512520" cy="3526920"/>
+            <a:ext cx="3512160" cy="3526560"/>
           </a:xfrm>
           <a:prstGeom prst="rect">
             <a:avLst/>
@@ -3977,7 +3977,7 @@
         <p:spPr>
           <a:xfrm>
             <a:off x="6013440" y="1872000"/>
-            <a:ext cx="3541320" cy="3526920"/>
+            <a:ext cx="3540960" cy="3526560"/>
           </a:xfrm>
           <a:prstGeom prst="rect">
             <a:avLst/>
@@ -4000,7 +4000,7 @@
         <p:spPr>
           <a:xfrm>
             <a:off x="6053400" y="1872000"/>
-            <a:ext cx="3501720" cy="3526920"/>
+            <a:ext cx="3501360" cy="3526560"/>
           </a:xfrm>
           <a:prstGeom prst="rect">
             <a:avLst/>
@@ -4019,7 +4019,7 @@
         <p:spPr>
           <a:xfrm>
             <a:off x="504000" y="300960"/>
-            <a:ext cx="9070560" cy="1261440"/>
+            <a:ext cx="9070200" cy="1261080"/>
           </a:xfrm>
           <a:prstGeom prst="rect">
             <a:avLst/>
@@ -4070,7 +4070,7 @@
         <p:spPr>
           <a:xfrm>
             <a:off x="504000" y="1768680"/>
-            <a:ext cx="5508360" cy="4062960"/>
+            <a:ext cx="5508000" cy="4062600"/>
           </a:xfrm>
           <a:prstGeom prst="rect">
             <a:avLst/>
@@ -4121,7 +4121,7 @@
             </a:endParaRPr>
           </a:p>
           <a:p>
-            <a:pPr marL="432000" indent="-322920">
+            <a:pPr marL="432000" indent="-322560">
               <a:lnSpc>
                 <a:spcPct val="100000"/>
               </a:lnSpc>
@@ -4173,7 +4173,7 @@
             </a:endParaRPr>
           </a:p>
           <a:p>
-            <a:pPr marL="432000" indent="-322920">
+            <a:pPr marL="432000" indent="-322560">
               <a:lnSpc>
                 <a:spcPct val="100000"/>
               </a:lnSpc>
@@ -4225,7 +4225,7 @@
             </a:endParaRPr>
           </a:p>
           <a:p>
-            <a:pPr marL="432000" indent="-322920">
+            <a:pPr marL="432000" indent="-322560">
               <a:lnSpc>
                 <a:spcPct val="100000"/>
               </a:lnSpc>
@@ -4277,7 +4277,7 @@
             </a:endParaRPr>
           </a:p>
           <a:p>
-            <a:pPr marL="432000" indent="-322920">
+            <a:pPr marL="432000" indent="-322560">
               <a:lnSpc>
                 <a:spcPct val="100000"/>
               </a:lnSpc>
@@ -4326,7 +4326,7 @@
         <p:spPr>
           <a:xfrm>
             <a:off x="0" y="6768000"/>
-            <a:ext cx="4966920" cy="790920"/>
+            <a:ext cx="4966560" cy="790560"/>
           </a:xfrm>
           <a:prstGeom prst="rect">
             <a:avLst/>
@@ -4377,7 +4377,7 @@
         <p:spPr>
           <a:xfrm>
             <a:off x="5112000" y="6768000"/>
-            <a:ext cx="4966920" cy="790920"/>
+            <a:ext cx="4966560" cy="790560"/>
           </a:xfrm>
           <a:prstGeom prst="rect">
             <a:avLst/>
@@ -4428,7 +4428,7 @@
         <p:spPr>
           <a:xfrm>
             <a:off x="504360" y="5904000"/>
-            <a:ext cx="9070560" cy="790920"/>
+            <a:ext cx="9070200" cy="790560"/>
           </a:xfrm>
           <a:prstGeom prst="rect">
             <a:avLst/>
@@ -4486,7 +4486,7 @@
         <p:spPr>
           <a:xfrm>
             <a:off x="6033240" y="1872000"/>
-            <a:ext cx="3542040" cy="3527640"/>
+            <a:ext cx="3541680" cy="3527280"/>
           </a:xfrm>
           <a:prstGeom prst="rect">
             <a:avLst/>
@@ -4505,7 +4505,7 @@
         <p:spPr>
           <a:xfrm>
             <a:off x="5977800" y="1821600"/>
-            <a:ext cx="3650760" cy="3598920"/>
+            <a:ext cx="3650400" cy="3598560"/>
           </a:xfrm>
           <a:prstGeom prst="rect">
             <a:avLst/>
@@ -5132,7 +5132,7 @@
         <p:spPr>
           <a:xfrm>
             <a:off x="504000" y="300960"/>
-            <a:ext cx="9070560" cy="1261440"/>
+            <a:ext cx="9070200" cy="1261080"/>
           </a:xfrm>
           <a:prstGeom prst="rect">
             <a:avLst/>
@@ -5183,7 +5183,7 @@
         <p:spPr>
           <a:xfrm>
             <a:off x="504000" y="1768680"/>
-            <a:ext cx="9070560" cy="4383360"/>
+            <a:ext cx="9070200" cy="4383000"/>
           </a:xfrm>
           <a:prstGeom prst="rect">
             <a:avLst/>
@@ -5217,7 +5217,7 @@
             </a:endParaRPr>
           </a:p>
           <a:p>
-            <a:pPr marL="432000" indent="-322920">
+            <a:pPr marL="432000" indent="-322560">
               <a:lnSpc>
                 <a:spcPct val="100000"/>
               </a:lnSpc>
@@ -5259,7 +5259,7 @@
             </a:endParaRPr>
           </a:p>
           <a:p>
-            <a:pPr marL="432000" indent="-322920">
+            <a:pPr marL="432000" indent="-322560">
               <a:lnSpc>
                 <a:spcPct val="100000"/>
               </a:lnSpc>
@@ -5298,7 +5298,7 @@
         <p:spPr>
           <a:xfrm>
             <a:off x="0" y="6768000"/>
-            <a:ext cx="4966920" cy="790920"/>
+            <a:ext cx="4966560" cy="790560"/>
           </a:xfrm>
           <a:prstGeom prst="rect">
             <a:avLst/>
@@ -5349,7 +5349,7 @@
         <p:spPr>
           <a:xfrm>
             <a:off x="5112000" y="6768000"/>
-            <a:ext cx="4966920" cy="790920"/>
+            <a:ext cx="4966560" cy="790560"/>
           </a:xfrm>
           <a:prstGeom prst="rect">
             <a:avLst/>
@@ -5404,7 +5404,7 @@
         <p:spPr>
           <a:xfrm>
             <a:off x="8373600" y="1908000"/>
-            <a:ext cx="733320" cy="1258920"/>
+            <a:ext cx="732960" cy="1258560"/>
           </a:xfrm>
           <a:prstGeom prst="rect">
             <a:avLst/>
@@ -5427,7 +5427,7 @@
         <p:spPr>
           <a:xfrm>
             <a:off x="8715600" y="4104000"/>
-            <a:ext cx="643320" cy="1258920"/>
+            <a:ext cx="642960" cy="1258560"/>
           </a:xfrm>
           <a:prstGeom prst="rect">
             <a:avLst/>
@@ -5446,9 +5446,9 @@
         <p:grpSpPr>
           <a:xfrm>
             <a:off x="6940800" y="4464000"/>
-            <a:ext cx="1846080" cy="1438920"/>
+            <a:ext cx="1846080" cy="1438560"/>
             <a:chOff x="6940800" y="4464000"/>
-            <a:chExt cx="1846080" cy="1438920"/>
+            <a:chExt cx="1846080" cy="1438560"/>
           </a:xfrm>
         </p:grpSpPr>
         <p:pic>
@@ -5464,7 +5464,7 @@
           <p:spPr>
             <a:xfrm>
               <a:off x="7696800" y="4896000"/>
-              <a:ext cx="812520" cy="1006920"/>
+              <a:ext cx="812160" cy="1006560"/>
             </a:xfrm>
             <a:prstGeom prst="rect">
               <a:avLst/>
@@ -5487,7 +5487,7 @@
           <p:spPr>
             <a:xfrm>
               <a:off x="6940800" y="4608000"/>
-              <a:ext cx="578520" cy="718920"/>
+              <a:ext cx="578160" cy="718560"/>
             </a:xfrm>
             <a:prstGeom prst="rect">
               <a:avLst/>
@@ -5505,8 +5505,8 @@
           </p:nvSpPr>
           <p:spPr>
             <a:xfrm flipV="1" rot="10800000">
-              <a:off x="8277480" y="4463640"/>
-              <a:ext cx="481320" cy="286920"/>
+              <a:off x="8277840" y="4464000"/>
+              <a:ext cx="480960" cy="286560"/>
             </a:xfrm>
             <a:custGeom>
               <a:avLst/>
@@ -5611,8 +5611,8 @@
           </p:nvSpPr>
           <p:spPr>
             <a:xfrm rot="10800000">
-              <a:off x="8499960" y="4672800"/>
-              <a:ext cx="286920" cy="250920"/>
+              <a:off x="8500320" y="4673160"/>
+              <a:ext cx="286560" cy="250560"/>
             </a:xfrm>
             <a:custGeom>
               <a:avLst/>
@@ -5953,7 +5953,7 @@
         <p:spPr>
           <a:xfrm>
             <a:off x="504000" y="300960"/>
-            <a:ext cx="9070560" cy="1261440"/>
+            <a:ext cx="9070200" cy="1261080"/>
           </a:xfrm>
           <a:prstGeom prst="rect">
             <a:avLst/>
@@ -6004,7 +6004,7 @@
         <p:spPr>
           <a:xfrm>
             <a:off x="504000" y="1768680"/>
-            <a:ext cx="9070560" cy="4383360"/>
+            <a:ext cx="9070200" cy="4383000"/>
           </a:xfrm>
           <a:prstGeom prst="rect">
             <a:avLst/>
@@ -6038,7 +6038,7 @@
             </a:endParaRPr>
           </a:p>
           <a:p>
-            <a:pPr marL="432000" indent="-322920">
+            <a:pPr marL="432000" indent="-322560">
               <a:lnSpc>
                 <a:spcPct val="100000"/>
               </a:lnSpc>
@@ -6080,7 +6080,7 @@
             </a:endParaRPr>
           </a:p>
           <a:p>
-            <a:pPr marL="432000" indent="-322920">
+            <a:pPr marL="432000" indent="-322560">
               <a:lnSpc>
                 <a:spcPct val="100000"/>
               </a:lnSpc>
@@ -6119,7 +6119,7 @@
         <p:spPr>
           <a:xfrm>
             <a:off x="0" y="6768000"/>
-            <a:ext cx="4966920" cy="790920"/>
+            <a:ext cx="4966560" cy="790560"/>
           </a:xfrm>
           <a:prstGeom prst="rect">
             <a:avLst/>
@@ -6170,7 +6170,7 @@
         <p:spPr>
           <a:xfrm>
             <a:off x="5112000" y="6768000"/>
-            <a:ext cx="4966920" cy="790920"/>
+            <a:ext cx="4966560" cy="790560"/>
           </a:xfrm>
           <a:prstGeom prst="rect">
             <a:avLst/>
@@ -6225,7 +6225,7 @@
         <p:spPr>
           <a:xfrm>
             <a:off x="7488000" y="2216880"/>
-            <a:ext cx="1932120" cy="1094040"/>
+            <a:ext cx="1931760" cy="1093680"/>
           </a:xfrm>
           <a:prstGeom prst="rect">
             <a:avLst/>
@@ -6248,7 +6248,7 @@
         <p:spPr>
           <a:xfrm>
             <a:off x="7488360" y="4460400"/>
-            <a:ext cx="1978560" cy="1262520"/>
+            <a:ext cx="1978200" cy="1262160"/>
           </a:xfrm>
           <a:prstGeom prst="rect">
             <a:avLst/>
@@ -6448,7 +6448,7 @@
         <p:spPr>
           <a:xfrm>
             <a:off x="504000" y="300960"/>
-            <a:ext cx="9070560" cy="1261440"/>
+            <a:ext cx="9070200" cy="1261080"/>
           </a:xfrm>
           <a:prstGeom prst="rect">
             <a:avLst/>
@@ -6499,7 +6499,7 @@
         <p:spPr>
           <a:xfrm>
             <a:off x="513360" y="1749960"/>
-            <a:ext cx="9070560" cy="4383360"/>
+            <a:ext cx="9070200" cy="4383000"/>
           </a:xfrm>
           <a:prstGeom prst="rect">
             <a:avLst/>
@@ -6530,7 +6530,7 @@
             </a:endParaRPr>
           </a:p>
           <a:p>
-            <a:pPr marL="432000" indent="-322920">
+            <a:pPr marL="432000" indent="-322560">
               <a:lnSpc>
                 <a:spcPct val="100000"/>
               </a:lnSpc>
@@ -6628,7 +6628,7 @@
             </a:endParaRPr>
           </a:p>
           <a:p>
-            <a:pPr marL="432000" indent="-322920">
+            <a:pPr marL="432000" indent="-322560">
               <a:lnSpc>
                 <a:spcPct val="100000"/>
               </a:lnSpc>
@@ -6711,7 +6711,7 @@
         <p:spPr>
           <a:xfrm>
             <a:off x="0" y="6768000"/>
-            <a:ext cx="4966920" cy="790920"/>
+            <a:ext cx="4966560" cy="790560"/>
           </a:xfrm>
           <a:prstGeom prst="rect">
             <a:avLst/>
@@ -6762,7 +6762,7 @@
         <p:spPr>
           <a:xfrm>
             <a:off x="5112000" y="6768000"/>
-            <a:ext cx="4966920" cy="790920"/>
+            <a:ext cx="4966560" cy="790560"/>
           </a:xfrm>
           <a:prstGeom prst="rect">
             <a:avLst/>
@@ -6817,7 +6817,7 @@
         <p:spPr>
           <a:xfrm>
             <a:off x="7212960" y="2340000"/>
-            <a:ext cx="2289960" cy="1269720"/>
+            <a:ext cx="2289600" cy="1269360"/>
           </a:xfrm>
           <a:prstGeom prst="rect">
             <a:avLst/>
@@ -6840,7 +6840,7 @@
         <p:spPr>
           <a:xfrm>
             <a:off x="6696000" y="4860000"/>
-            <a:ext cx="2918520" cy="718920"/>
+            <a:ext cx="2918160" cy="718560"/>
           </a:xfrm>
           <a:prstGeom prst="rect">
             <a:avLst/>
@@ -7040,7 +7040,7 @@
         <p:spPr>
           <a:xfrm>
             <a:off x="504000" y="300960"/>
-            <a:ext cx="9070560" cy="1261440"/>
+            <a:ext cx="9070200" cy="1261080"/>
           </a:xfrm>
           <a:prstGeom prst="rect">
             <a:avLst/>
@@ -7091,7 +7091,7 @@
         <p:spPr>
           <a:xfrm>
             <a:off x="513360" y="1740600"/>
-            <a:ext cx="9070560" cy="778320"/>
+            <a:ext cx="9070200" cy="777960"/>
           </a:xfrm>
           <a:prstGeom prst="rect">
             <a:avLst/>
@@ -7112,7 +7112,7 @@
             <a:normAutofit/>
           </a:bodyPr>
           <a:p>
-            <a:pPr marL="432000" indent="-322920">
+            <a:pPr marL="432000" indent="-322560">
               <a:lnSpc>
                 <a:spcPct val="100000"/>
               </a:lnSpc>
@@ -7171,7 +7171,7 @@
         <p:spPr>
           <a:xfrm>
             <a:off x="0" y="6768000"/>
-            <a:ext cx="4966920" cy="790920"/>
+            <a:ext cx="4966560" cy="790560"/>
           </a:xfrm>
           <a:prstGeom prst="rect">
             <a:avLst/>
@@ -7222,7 +7222,7 @@
         <p:spPr>
           <a:xfrm>
             <a:off x="5112000" y="6768000"/>
-            <a:ext cx="4966920" cy="790920"/>
+            <a:ext cx="4966560" cy="790560"/>
           </a:xfrm>
           <a:prstGeom prst="rect">
             <a:avLst/>
@@ -7273,7 +7273,7 @@
         <p:spPr>
           <a:xfrm>
             <a:off x="4032720" y="2521080"/>
-            <a:ext cx="2518920" cy="4174920"/>
+            <a:ext cx="2518560" cy="4174560"/>
           </a:xfrm>
           <a:custGeom>
             <a:avLst/>
@@ -7595,7 +7595,7 @@
         <p:spPr>
           <a:xfrm>
             <a:off x="4608360" y="3313080"/>
-            <a:ext cx="1727280" cy="2486880"/>
+            <a:ext cx="1726920" cy="2486520"/>
           </a:xfrm>
           <a:custGeom>
             <a:avLst/>
@@ -7841,7 +7841,7 @@
         <p:spPr>
           <a:xfrm>
             <a:off x="4778640" y="4105080"/>
-            <a:ext cx="548640" cy="548640"/>
+            <a:ext cx="548280" cy="548280"/>
           </a:xfrm>
           <a:prstGeom prst="rect">
             <a:avLst/>
@@ -7864,7 +7864,7 @@
         <p:spPr>
           <a:xfrm>
             <a:off x="5616360" y="4285080"/>
-            <a:ext cx="548640" cy="548640"/>
+            <a:ext cx="548280" cy="548280"/>
           </a:xfrm>
           <a:prstGeom prst="rect">
             <a:avLst/>
@@ -7887,7 +7887,7 @@
         <p:spPr>
           <a:xfrm>
             <a:off x="5616360" y="4969080"/>
-            <a:ext cx="548640" cy="548640"/>
+            <a:ext cx="548280" cy="548280"/>
           </a:xfrm>
           <a:prstGeom prst="rect">
             <a:avLst/>
@@ -7951,7 +7951,7 @@
         <p:spPr>
           <a:xfrm>
             <a:off x="504000" y="300960"/>
-            <a:ext cx="9070560" cy="1261440"/>
+            <a:ext cx="9070200" cy="1261080"/>
           </a:xfrm>
           <a:prstGeom prst="rect">
             <a:avLst/>
@@ -8002,7 +8002,7 @@
         <p:spPr>
           <a:xfrm>
             <a:off x="513360" y="1740600"/>
-            <a:ext cx="9070560" cy="778320"/>
+            <a:ext cx="9070200" cy="777960"/>
           </a:xfrm>
           <a:prstGeom prst="rect">
             <a:avLst/>
@@ -8023,7 +8023,7 @@
             <a:normAutofit/>
           </a:bodyPr>
           <a:p>
-            <a:pPr marL="432000" indent="-322920">
+            <a:pPr marL="432000" indent="-322560">
               <a:lnSpc>
                 <a:spcPct val="100000"/>
               </a:lnSpc>
@@ -8062,7 +8062,7 @@
         <p:spPr>
           <a:xfrm>
             <a:off x="0" y="6768000"/>
-            <a:ext cx="4966920" cy="790920"/>
+            <a:ext cx="4966560" cy="790560"/>
           </a:xfrm>
           <a:prstGeom prst="rect">
             <a:avLst/>
@@ -8113,7 +8113,7 @@
         <p:spPr>
           <a:xfrm>
             <a:off x="5112000" y="6768000"/>
-            <a:ext cx="4966920" cy="790920"/>
+            <a:ext cx="4966560" cy="790560"/>
           </a:xfrm>
           <a:prstGeom prst="rect">
             <a:avLst/>
@@ -8164,7 +8164,7 @@
         <p:spPr>
           <a:xfrm>
             <a:off x="4032360" y="2520720"/>
-            <a:ext cx="2518920" cy="4174920"/>
+            <a:ext cx="2518560" cy="4174560"/>
           </a:xfrm>
           <a:custGeom>
             <a:avLst/>
@@ -8486,7 +8486,7 @@
         <p:spPr>
           <a:xfrm>
             <a:off x="4608000" y="3312720"/>
-            <a:ext cx="1727280" cy="2486880"/>
+            <a:ext cx="1726920" cy="2486520"/>
           </a:xfrm>
           <a:custGeom>
             <a:avLst/>
@@ -8732,7 +8732,7 @@
         <p:spPr>
           <a:xfrm>
             <a:off x="4778280" y="4104720"/>
-            <a:ext cx="548640" cy="548640"/>
+            <a:ext cx="548280" cy="548280"/>
           </a:xfrm>
           <a:prstGeom prst="rect">
             <a:avLst/>
@@ -8751,7 +8751,7 @@
         <p:spPr>
           <a:xfrm>
             <a:off x="4464000" y="5041080"/>
-            <a:ext cx="899280" cy="1510560"/>
+            <a:ext cx="898920" cy="1510200"/>
           </a:xfrm>
           <a:custGeom>
             <a:avLst/>
@@ -8955,7 +8955,7 @@
         <p:spPr>
           <a:xfrm>
             <a:off x="4753800" y="5218920"/>
-            <a:ext cx="466920" cy="430920"/>
+            <a:ext cx="466560" cy="430560"/>
           </a:xfrm>
           <a:prstGeom prst="can">
             <a:avLst>
@@ -9016,7 +9016,7 @@
         <p:spPr>
           <a:xfrm>
             <a:off x="5616000" y="4284720"/>
-            <a:ext cx="548640" cy="548640"/>
+            <a:ext cx="548280" cy="548280"/>
           </a:xfrm>
           <a:prstGeom prst="rect">
             <a:avLst/>
@@ -9039,7 +9039,7 @@
         <p:spPr>
           <a:xfrm>
             <a:off x="5616000" y="4968720"/>
-            <a:ext cx="548640" cy="548640"/>
+            <a:ext cx="548280" cy="548280"/>
           </a:xfrm>
           <a:prstGeom prst="rect">
             <a:avLst/>
@@ -9103,7 +9103,7 @@
         <p:spPr>
           <a:xfrm>
             <a:off x="0" y="6768000"/>
-            <a:ext cx="4966920" cy="790920"/>
+            <a:ext cx="4966560" cy="790560"/>
           </a:xfrm>
           <a:prstGeom prst="rect">
             <a:avLst/>
@@ -9154,7 +9154,7 @@
         <p:spPr>
           <a:xfrm>
             <a:off x="504000" y="300960"/>
-            <a:ext cx="9070560" cy="1261440"/>
+            <a:ext cx="9070200" cy="1261080"/>
           </a:xfrm>
           <a:prstGeom prst="rect">
             <a:avLst/>
@@ -9205,7 +9205,7 @@
         <p:spPr>
           <a:xfrm>
             <a:off x="513360" y="1740600"/>
-            <a:ext cx="9070560" cy="778320"/>
+            <a:ext cx="9070200" cy="777960"/>
           </a:xfrm>
           <a:prstGeom prst="rect">
             <a:avLst/>
@@ -9226,7 +9226,7 @@
             <a:normAutofit/>
           </a:bodyPr>
           <a:p>
-            <a:pPr marL="432000" indent="-322920">
+            <a:pPr marL="432000" indent="-322560">
               <a:lnSpc>
                 <a:spcPct val="100000"/>
               </a:lnSpc>
@@ -9265,7 +9265,7 @@
         <p:spPr>
           <a:xfrm>
             <a:off x="5112000" y="6768000"/>
-            <a:ext cx="4966920" cy="790920"/>
+            <a:ext cx="4966560" cy="790560"/>
           </a:xfrm>
           <a:prstGeom prst="rect">
             <a:avLst/>
@@ -9316,7 +9316,7 @@
         <p:spPr>
           <a:xfrm>
             <a:off x="4032360" y="2520720"/>
-            <a:ext cx="2518920" cy="4174920"/>
+            <a:ext cx="2518560" cy="4174560"/>
           </a:xfrm>
           <a:custGeom>
             <a:avLst/>
@@ -9638,7 +9638,7 @@
         <p:spPr>
           <a:xfrm>
             <a:off x="4608000" y="3312720"/>
-            <a:ext cx="1727280" cy="2486880"/>
+            <a:ext cx="1726920" cy="2486520"/>
           </a:xfrm>
           <a:custGeom>
             <a:avLst/>
@@ -9884,7 +9884,7 @@
         <p:spPr>
           <a:xfrm>
             <a:off x="4778280" y="4104720"/>
-            <a:ext cx="548640" cy="548640"/>
+            <a:ext cx="548280" cy="548280"/>
           </a:xfrm>
           <a:prstGeom prst="rect">
             <a:avLst/>
@@ -9903,7 +9903,7 @@
         <p:spPr>
           <a:xfrm>
             <a:off x="4464000" y="5041080"/>
-            <a:ext cx="899280" cy="1510560"/>
+            <a:ext cx="898920" cy="1510200"/>
           </a:xfrm>
           <a:custGeom>
             <a:avLst/>
@@ -10107,7 +10107,7 @@
         <p:spPr>
           <a:xfrm>
             <a:off x="4753800" y="5218920"/>
-            <a:ext cx="466920" cy="430920"/>
+            <a:ext cx="466560" cy="430560"/>
           </a:xfrm>
           <a:prstGeom prst="can">
             <a:avLst>
@@ -10168,7 +10168,7 @@
         <p:spPr>
           <a:xfrm>
             <a:off x="8136000" y="3581280"/>
-            <a:ext cx="750960" cy="522360"/>
+            <a:ext cx="750600" cy="522000"/>
           </a:xfrm>
           <a:prstGeom prst="rect">
             <a:avLst/>
@@ -10191,7 +10191,7 @@
         <p:spPr>
           <a:xfrm>
             <a:off x="8498880" y="4691160"/>
-            <a:ext cx="608040" cy="636480"/>
+            <a:ext cx="607680" cy="636120"/>
           </a:xfrm>
           <a:prstGeom prst="rect">
             <a:avLst/>
@@ -10214,7 +10214,7 @@
         <p:spPr>
           <a:xfrm>
             <a:off x="8479800" y="2880720"/>
-            <a:ext cx="627120" cy="712800"/>
+            <a:ext cx="626760" cy="712440"/>
           </a:xfrm>
           <a:prstGeom prst="rect">
             <a:avLst/>
@@ -10237,7 +10237,7 @@
         <p:spPr>
           <a:xfrm>
             <a:off x="8815680" y="5904720"/>
-            <a:ext cx="543240" cy="506160"/>
+            <a:ext cx="542880" cy="505800"/>
           </a:xfrm>
           <a:prstGeom prst="rect">
             <a:avLst/>
@@ -10260,7 +10260,7 @@
         <p:spPr>
           <a:xfrm>
             <a:off x="8604000" y="5364720"/>
-            <a:ext cx="609120" cy="446400"/>
+            <a:ext cx="608760" cy="446040"/>
           </a:xfrm>
           <a:prstGeom prst="rect">
             <a:avLst/>
@@ -10283,7 +10283,7 @@
         <p:spPr>
           <a:xfrm>
             <a:off x="8787960" y="2462040"/>
-            <a:ext cx="621720" cy="345600"/>
+            <a:ext cx="621360" cy="345240"/>
           </a:xfrm>
           <a:prstGeom prst="rect">
             <a:avLst/>
@@ -10302,9 +10302,9 @@
         <p:grpSpPr>
           <a:xfrm>
             <a:off x="6749640" y="3780000"/>
-            <a:ext cx="1085040" cy="1583280"/>
+            <a:ext cx="1084680" cy="1582920"/>
             <a:chOff x="6749640" y="3780000"/>
-            <a:chExt cx="1085040" cy="1583280"/>
+            <a:chExt cx="1084680" cy="1582920"/>
           </a:xfrm>
         </p:grpSpPr>
         <p:sp>
@@ -10316,7 +10316,7 @@
           <p:spPr>
             <a:xfrm rot="5196600">
               <a:off x="6528240" y="4073400"/>
-              <a:ext cx="1527120" cy="996480"/>
+              <a:ext cx="1526760" cy="996120"/>
             </a:xfrm>
             <a:custGeom>
               <a:avLst/>
@@ -10561,7 +10561,7 @@
           <p:spPr>
             <a:xfrm>
               <a:off x="7042320" y="4320720"/>
-              <a:ext cx="588600" cy="574920"/>
+              <a:ext cx="588240" cy="574560"/>
             </a:xfrm>
             <a:prstGeom prst="rect">
               <a:avLst/>
@@ -10641,7 +10641,7 @@
         <p:spPr>
           <a:xfrm>
             <a:off x="8835480" y="3714480"/>
-            <a:ext cx="645840" cy="289080"/>
+            <a:ext cx="645480" cy="288720"/>
           </a:xfrm>
           <a:prstGeom prst="rect">
             <a:avLst/>
@@ -10692,7 +10692,7 @@
         <p:spPr>
           <a:xfrm>
             <a:off x="9051840" y="3246480"/>
-            <a:ext cx="656640" cy="289080"/>
+            <a:ext cx="656280" cy="288720"/>
           </a:xfrm>
           <a:prstGeom prst="rect">
             <a:avLst/>
@@ -10743,7 +10743,7 @@
         <p:spPr>
           <a:xfrm>
             <a:off x="9303840" y="2670480"/>
-            <a:ext cx="665640" cy="289080"/>
+            <a:ext cx="665280" cy="288720"/>
           </a:xfrm>
           <a:prstGeom prst="rect">
             <a:avLst/>
@@ -10794,7 +10794,7 @@
         <p:spPr>
           <a:xfrm>
             <a:off x="9015840" y="4614480"/>
-            <a:ext cx="763200" cy="289080"/>
+            <a:ext cx="762840" cy="288720"/>
           </a:xfrm>
           <a:prstGeom prst="rect">
             <a:avLst/>
@@ -10845,7 +10845,7 @@
         <p:spPr>
           <a:xfrm>
             <a:off x="9088200" y="5226480"/>
-            <a:ext cx="774000" cy="289080"/>
+            <a:ext cx="773640" cy="288720"/>
           </a:xfrm>
           <a:prstGeom prst="rect">
             <a:avLst/>
@@ -10896,7 +10896,7 @@
         <p:spPr>
           <a:xfrm>
             <a:off x="9268560" y="5838480"/>
-            <a:ext cx="783000" cy="289080"/>
+            <a:ext cx="782640" cy="288720"/>
           </a:xfrm>
           <a:prstGeom prst="rect">
             <a:avLst/>
@@ -10951,7 +10951,7 @@
         <p:spPr>
           <a:xfrm>
             <a:off x="5616000" y="4284720"/>
-            <a:ext cx="548640" cy="548640"/>
+            <a:ext cx="548280" cy="548280"/>
           </a:xfrm>
           <a:prstGeom prst="rect">
             <a:avLst/>
@@ -10974,7 +10974,7 @@
         <p:spPr>
           <a:xfrm>
             <a:off x="5616000" y="4968720"/>
-            <a:ext cx="548640" cy="548640"/>
+            <a:ext cx="548280" cy="548280"/>
           </a:xfrm>
           <a:prstGeom prst="rect">
             <a:avLst/>
@@ -11038,7 +11038,7 @@
         <p:spPr>
           <a:xfrm>
             <a:off x="504000" y="300960"/>
-            <a:ext cx="9070560" cy="1261440"/>
+            <a:ext cx="9070200" cy="1261080"/>
           </a:xfrm>
           <a:prstGeom prst="rect">
             <a:avLst/>
@@ -11089,7 +11089,7 @@
         <p:spPr>
           <a:xfrm>
             <a:off x="513360" y="1740600"/>
-            <a:ext cx="9070560" cy="778320"/>
+            <a:ext cx="9070200" cy="777960"/>
           </a:xfrm>
           <a:prstGeom prst="rect">
             <a:avLst/>
@@ -11110,7 +11110,7 @@
             <a:normAutofit/>
           </a:bodyPr>
           <a:p>
-            <a:pPr marL="432000" indent="-322920">
+            <a:pPr marL="432000" indent="-322560">
               <a:lnSpc>
                 <a:spcPct val="100000"/>
               </a:lnSpc>
@@ -11169,7 +11169,7 @@
         <p:spPr>
           <a:xfrm>
             <a:off x="0" y="6768000"/>
-            <a:ext cx="4966920" cy="790920"/>
+            <a:ext cx="4966560" cy="790560"/>
           </a:xfrm>
           <a:prstGeom prst="rect">
             <a:avLst/>
@@ -11220,7 +11220,7 @@
         <p:spPr>
           <a:xfrm>
             <a:off x="5112000" y="6768000"/>
-            <a:ext cx="4966920" cy="790920"/>
+            <a:ext cx="4966560" cy="790560"/>
           </a:xfrm>
           <a:prstGeom prst="rect">
             <a:avLst/>
@@ -11270,10 +11270,10 @@
         </p:nvGrpSpPr>
         <p:grpSpPr>
           <a:xfrm>
-            <a:off x="2662920" y="3596400"/>
-            <a:ext cx="1285560" cy="2128320"/>
-            <a:chOff x="2662920" y="3596400"/>
-            <a:chExt cx="1285560" cy="2128320"/>
+            <a:off x="2662560" y="3596760"/>
+            <a:ext cx="1285200" cy="2127960"/>
+            <a:chOff x="2662560" y="3596760"/>
+            <a:chExt cx="1285200" cy="2127960"/>
           </a:xfrm>
         </p:grpSpPr>
         <p:sp>
@@ -11284,8 +11284,8 @@
           </p:nvSpPr>
           <p:spPr>
             <a:xfrm rot="16677600">
-              <a:off x="2301840" y="4151880"/>
-              <a:ext cx="2007000" cy="1017360"/>
+              <a:off x="2301480" y="4151880"/>
+              <a:ext cx="2006640" cy="1017000"/>
             </a:xfrm>
             <a:custGeom>
               <a:avLst/>
@@ -11529,8 +11529,8 @@
           </p:blipFill>
           <p:spPr>
             <a:xfrm rot="16200000">
-              <a:off x="2882520" y="4527720"/>
-              <a:ext cx="875160" cy="301680"/>
+              <a:off x="2882520" y="4528080"/>
+              <a:ext cx="874800" cy="301320"/>
             </a:xfrm>
             <a:prstGeom prst="rect">
               <a:avLst/>
@@ -11550,7 +11550,7 @@
         <p:spPr>
           <a:xfrm>
             <a:off x="4032360" y="2520720"/>
-            <a:ext cx="2518920" cy="4174920"/>
+            <a:ext cx="2518560" cy="4174560"/>
           </a:xfrm>
           <a:custGeom>
             <a:avLst/>
@@ -11872,7 +11872,7 @@
         <p:spPr>
           <a:xfrm>
             <a:off x="4608000" y="3312720"/>
-            <a:ext cx="1727280" cy="2486880"/>
+            <a:ext cx="1726920" cy="2486520"/>
           </a:xfrm>
           <a:custGeom>
             <a:avLst/>
@@ -12118,7 +12118,7 @@
         <p:spPr>
           <a:xfrm>
             <a:off x="4778280" y="4104720"/>
-            <a:ext cx="548640" cy="548640"/>
+            <a:ext cx="548280" cy="548280"/>
           </a:xfrm>
           <a:prstGeom prst="rect">
             <a:avLst/>
@@ -12137,7 +12137,7 @@
         <p:spPr>
           <a:xfrm>
             <a:off x="4464000" y="5041080"/>
-            <a:ext cx="899280" cy="1510560"/>
+            <a:ext cx="898920" cy="1510200"/>
           </a:xfrm>
           <a:custGeom>
             <a:avLst/>
@@ -12341,7 +12341,7 @@
         <p:spPr>
           <a:xfrm>
             <a:off x="4753800" y="5218920"/>
-            <a:ext cx="466920" cy="430920"/>
+            <a:ext cx="466560" cy="430560"/>
           </a:xfrm>
           <a:prstGeom prst="can">
             <a:avLst>
@@ -12402,7 +12402,7 @@
         <p:spPr>
           <a:xfrm>
             <a:off x="8136000" y="3581280"/>
-            <a:ext cx="750960" cy="522360"/>
+            <a:ext cx="750600" cy="522000"/>
           </a:xfrm>
           <a:prstGeom prst="rect">
             <a:avLst/>
@@ -12425,7 +12425,7 @@
         <p:spPr>
           <a:xfrm>
             <a:off x="8498880" y="4691160"/>
-            <a:ext cx="608040" cy="636480"/>
+            <a:ext cx="607680" cy="636120"/>
           </a:xfrm>
           <a:prstGeom prst="rect">
             <a:avLst/>
@@ -12448,7 +12448,7 @@
         <p:spPr>
           <a:xfrm>
             <a:off x="8479800" y="2880720"/>
-            <a:ext cx="627120" cy="712800"/>
+            <a:ext cx="626760" cy="712440"/>
           </a:xfrm>
           <a:prstGeom prst="rect">
             <a:avLst/>
@@ -12471,7 +12471,7 @@
         <p:spPr>
           <a:xfrm>
             <a:off x="8815680" y="5904720"/>
-            <a:ext cx="543240" cy="506160"/>
+            <a:ext cx="542880" cy="505800"/>
           </a:xfrm>
           <a:prstGeom prst="rect">
             <a:avLst/>
@@ -12494,7 +12494,7 @@
         <p:spPr>
           <a:xfrm>
             <a:off x="8604000" y="5364720"/>
-            <a:ext cx="609120" cy="446400"/>
+            <a:ext cx="608760" cy="446040"/>
           </a:xfrm>
           <a:prstGeom prst="rect">
             <a:avLst/>
@@ -12517,7 +12517,7 @@
         <p:spPr>
           <a:xfrm>
             <a:off x="8787960" y="2462040"/>
-            <a:ext cx="621720" cy="345600"/>
+            <a:ext cx="621360" cy="345240"/>
           </a:xfrm>
           <a:prstGeom prst="rect">
             <a:avLst/>
@@ -12536,9 +12536,9 @@
         <p:grpSpPr>
           <a:xfrm>
             <a:off x="6749640" y="3780000"/>
-            <a:ext cx="1085040" cy="1583280"/>
+            <a:ext cx="1084680" cy="1582920"/>
             <a:chOff x="6749640" y="3780000"/>
-            <a:chExt cx="1085040" cy="1583280"/>
+            <a:chExt cx="1084680" cy="1582920"/>
           </a:xfrm>
         </p:grpSpPr>
         <p:sp>
@@ -12550,7 +12550,7 @@
           <p:spPr>
             <a:xfrm rot="5196600">
               <a:off x="6528240" y="4073400"/>
-              <a:ext cx="1527120" cy="996480"/>
+              <a:ext cx="1526760" cy="996120"/>
             </a:xfrm>
             <a:custGeom>
               <a:avLst/>
@@ -12795,7 +12795,7 @@
           <p:spPr>
             <a:xfrm>
               <a:off x="7042320" y="4320720"/>
-              <a:ext cx="588600" cy="574920"/>
+              <a:ext cx="588240" cy="574560"/>
             </a:xfrm>
             <a:prstGeom prst="rect">
               <a:avLst/>
@@ -12875,7 +12875,7 @@
         <p:spPr>
           <a:xfrm>
             <a:off x="8835480" y="3714480"/>
-            <a:ext cx="645840" cy="289080"/>
+            <a:ext cx="645480" cy="288720"/>
           </a:xfrm>
           <a:prstGeom prst="rect">
             <a:avLst/>
@@ -12926,7 +12926,7 @@
         <p:spPr>
           <a:xfrm>
             <a:off x="9051840" y="3246480"/>
-            <a:ext cx="656640" cy="289080"/>
+            <a:ext cx="656280" cy="288720"/>
           </a:xfrm>
           <a:prstGeom prst="rect">
             <a:avLst/>
@@ -12977,7 +12977,7 @@
         <p:spPr>
           <a:xfrm>
             <a:off x="9303840" y="2670480"/>
-            <a:ext cx="665640" cy="289080"/>
+            <a:ext cx="665280" cy="288720"/>
           </a:xfrm>
           <a:prstGeom prst="rect">
             <a:avLst/>
@@ -13028,7 +13028,7 @@
         <p:spPr>
           <a:xfrm>
             <a:off x="9015840" y="4614480"/>
-            <a:ext cx="763200" cy="289080"/>
+            <a:ext cx="762840" cy="288720"/>
           </a:xfrm>
           <a:prstGeom prst="rect">
             <a:avLst/>
@@ -13079,7 +13079,7 @@
         <p:spPr>
           <a:xfrm>
             <a:off x="9088200" y="5226480"/>
-            <a:ext cx="774000" cy="289080"/>
+            <a:ext cx="773640" cy="288720"/>
           </a:xfrm>
           <a:prstGeom prst="rect">
             <a:avLst/>
@@ -13130,7 +13130,7 @@
         <p:spPr>
           <a:xfrm>
             <a:off x="9268560" y="5838480"/>
-            <a:ext cx="783000" cy="289080"/>
+            <a:ext cx="782640" cy="288720"/>
           </a:xfrm>
           <a:prstGeom prst="rect">
             <a:avLst/>
@@ -13185,7 +13185,7 @@
         <p:spPr>
           <a:xfrm>
             <a:off x="936000" y="2661120"/>
-            <a:ext cx="1438920" cy="1438920"/>
+            <a:ext cx="1438560" cy="1438560"/>
           </a:xfrm>
           <a:prstGeom prst="rect">
             <a:avLst/>
@@ -13208,7 +13208,7 @@
         <p:spPr>
           <a:xfrm>
             <a:off x="1368000" y="2913120"/>
-            <a:ext cx="574920" cy="574920"/>
+            <a:ext cx="574560" cy="574560"/>
           </a:xfrm>
           <a:prstGeom prst="rect">
             <a:avLst/>
@@ -13261,7 +13261,7 @@
         <p:spPr>
           <a:xfrm>
             <a:off x="5616000" y="4284720"/>
-            <a:ext cx="548640" cy="548640"/>
+            <a:ext cx="548280" cy="548280"/>
           </a:xfrm>
           <a:prstGeom prst="rect">
             <a:avLst/>
@@ -13284,7 +13284,7 @@
         <p:spPr>
           <a:xfrm>
             <a:off x="5616000" y="4968720"/>
-            <a:ext cx="548640" cy="548640"/>
+            <a:ext cx="548280" cy="548280"/>
           </a:xfrm>
           <a:prstGeom prst="rect">
             <a:avLst/>
@@ -13347,10 +13347,10 @@
         </p:nvGrpSpPr>
         <p:grpSpPr>
           <a:xfrm>
-            <a:off x="2662920" y="3595680"/>
-            <a:ext cx="1285560" cy="2128320"/>
-            <a:chOff x="2662920" y="3595680"/>
-            <a:chExt cx="1285560" cy="2128320"/>
+            <a:off x="2662560" y="3596040"/>
+            <a:ext cx="1285200" cy="2127960"/>
+            <a:chOff x="2662560" y="3596040"/>
+            <a:chExt cx="1285200" cy="2127960"/>
           </a:xfrm>
         </p:grpSpPr>
         <p:sp>
@@ -13361,8 +13361,8 @@
           </p:nvSpPr>
           <p:spPr>
             <a:xfrm rot="16677600">
-              <a:off x="2301840" y="4151160"/>
-              <a:ext cx="2007000" cy="1017360"/>
+              <a:off x="2301480" y="4151160"/>
+              <a:ext cx="2006640" cy="1017000"/>
             </a:xfrm>
             <a:custGeom>
               <a:avLst/>
@@ -13606,8 +13606,8 @@
           </p:blipFill>
           <p:spPr>
             <a:xfrm rot="16200000">
-              <a:off x="2882520" y="4527000"/>
-              <a:ext cx="875160" cy="301680"/>
+              <a:off x="2882520" y="4527360"/>
+              <a:ext cx="874800" cy="301320"/>
             </a:xfrm>
             <a:prstGeom prst="rect">
               <a:avLst/>
@@ -13627,7 +13627,7 @@
         <p:spPr>
           <a:xfrm>
             <a:off x="504000" y="300960"/>
-            <a:ext cx="9070560" cy="1261440"/>
+            <a:ext cx="9070200" cy="1261080"/>
           </a:xfrm>
           <a:prstGeom prst="rect">
             <a:avLst/>
@@ -13678,7 +13678,7 @@
         <p:spPr>
           <a:xfrm>
             <a:off x="513360" y="1740600"/>
-            <a:ext cx="9070560" cy="778320"/>
+            <a:ext cx="9070200" cy="777960"/>
           </a:xfrm>
           <a:prstGeom prst="rect">
             <a:avLst/>
@@ -13699,7 +13699,7 @@
             <a:normAutofit/>
           </a:bodyPr>
           <a:p>
-            <a:pPr marL="432000" indent="-322920">
+            <a:pPr marL="432000" indent="-322560">
               <a:lnSpc>
                 <a:spcPct val="100000"/>
               </a:lnSpc>
@@ -13738,7 +13738,7 @@
         <p:spPr>
           <a:xfrm>
             <a:off x="0" y="6768000"/>
-            <a:ext cx="4966920" cy="790920"/>
+            <a:ext cx="4966560" cy="790560"/>
           </a:xfrm>
           <a:prstGeom prst="rect">
             <a:avLst/>
@@ -13789,7 +13789,7 @@
         <p:spPr>
           <a:xfrm>
             <a:off x="5112000" y="6768000"/>
-            <a:ext cx="4966920" cy="790920"/>
+            <a:ext cx="4966560" cy="790560"/>
           </a:xfrm>
           <a:prstGeom prst="rect">
             <a:avLst/>
@@ -13840,7 +13840,7 @@
         <p:spPr>
           <a:xfrm>
             <a:off x="4032360" y="2520000"/>
-            <a:ext cx="2518920" cy="4174920"/>
+            <a:ext cx="2518560" cy="4174560"/>
           </a:xfrm>
           <a:custGeom>
             <a:avLst/>
@@ -14162,7 +14162,7 @@
         <p:spPr>
           <a:xfrm>
             <a:off x="4608000" y="3312000"/>
-            <a:ext cx="1727280" cy="2486880"/>
+            <a:ext cx="1726920" cy="2486520"/>
           </a:xfrm>
           <a:custGeom>
             <a:avLst/>
@@ -14408,7 +14408,7 @@
         <p:spPr>
           <a:xfrm>
             <a:off x="4778280" y="4104000"/>
-            <a:ext cx="548640" cy="548640"/>
+            <a:ext cx="548280" cy="548280"/>
           </a:xfrm>
           <a:prstGeom prst="rect">
             <a:avLst/>
@@ -14427,7 +14427,7 @@
         <p:spPr>
           <a:xfrm>
             <a:off x="4464000" y="5040360"/>
-            <a:ext cx="899280" cy="1510560"/>
+            <a:ext cx="898920" cy="1510200"/>
           </a:xfrm>
           <a:custGeom>
             <a:avLst/>
@@ -14631,7 +14631,7 @@
         <p:spPr>
           <a:xfrm>
             <a:off x="4753800" y="5218200"/>
-            <a:ext cx="466920" cy="430920"/>
+            <a:ext cx="466560" cy="430560"/>
           </a:xfrm>
           <a:prstGeom prst="can">
             <a:avLst>
@@ -14692,7 +14692,7 @@
         <p:spPr>
           <a:xfrm>
             <a:off x="8136000" y="3580560"/>
-            <a:ext cx="750960" cy="522360"/>
+            <a:ext cx="750600" cy="522000"/>
           </a:xfrm>
           <a:prstGeom prst="rect">
             <a:avLst/>
@@ -14715,7 +14715,7 @@
         <p:spPr>
           <a:xfrm>
             <a:off x="8498880" y="4690440"/>
-            <a:ext cx="608040" cy="636480"/>
+            <a:ext cx="607680" cy="636120"/>
           </a:xfrm>
           <a:prstGeom prst="rect">
             <a:avLst/>
@@ -14738,7 +14738,7 @@
         <p:spPr>
           <a:xfrm>
             <a:off x="8479800" y="2880000"/>
-            <a:ext cx="627120" cy="712800"/>
+            <a:ext cx="626760" cy="712440"/>
           </a:xfrm>
           <a:prstGeom prst="rect">
             <a:avLst/>
@@ -14761,7 +14761,7 @@
         <p:spPr>
           <a:xfrm>
             <a:off x="8815680" y="5904000"/>
-            <a:ext cx="543240" cy="506160"/>
+            <a:ext cx="542880" cy="505800"/>
           </a:xfrm>
           <a:prstGeom prst="rect">
             <a:avLst/>
@@ -14784,7 +14784,7 @@
         <p:spPr>
           <a:xfrm>
             <a:off x="8604000" y="5364000"/>
-            <a:ext cx="609120" cy="446400"/>
+            <a:ext cx="608760" cy="446040"/>
           </a:xfrm>
           <a:prstGeom prst="rect">
             <a:avLst/>
@@ -14807,7 +14807,7 @@
         <p:spPr>
           <a:xfrm>
             <a:off x="8787960" y="2461320"/>
-            <a:ext cx="621720" cy="345600"/>
+            <a:ext cx="621360" cy="345240"/>
           </a:xfrm>
           <a:prstGeom prst="rect">
             <a:avLst/>
@@ -14826,9 +14826,9 @@
         <p:grpSpPr>
           <a:xfrm>
             <a:off x="6749640" y="3779280"/>
-            <a:ext cx="1085040" cy="1583280"/>
+            <a:ext cx="1084680" cy="1582920"/>
             <a:chOff x="6749640" y="3779280"/>
-            <a:chExt cx="1085040" cy="1583280"/>
+            <a:chExt cx="1084680" cy="1582920"/>
           </a:xfrm>
         </p:grpSpPr>
         <p:sp>
@@ -14840,7 +14840,7 @@
           <p:spPr>
             <a:xfrm rot="5196600">
               <a:off x="6528240" y="4072680"/>
-              <a:ext cx="1527120" cy="996480"/>
+              <a:ext cx="1526760" cy="996120"/>
             </a:xfrm>
             <a:custGeom>
               <a:avLst/>
@@ -15085,7 +15085,7 @@
           <p:spPr>
             <a:xfrm>
               <a:off x="7042320" y="4320000"/>
-              <a:ext cx="588600" cy="574920"/>
+              <a:ext cx="588240" cy="574560"/>
             </a:xfrm>
             <a:prstGeom prst="rect">
               <a:avLst/>
@@ -15165,7 +15165,7 @@
         <p:spPr>
           <a:xfrm>
             <a:off x="8835480" y="3713760"/>
-            <a:ext cx="645840" cy="289080"/>
+            <a:ext cx="645480" cy="288720"/>
           </a:xfrm>
           <a:prstGeom prst="rect">
             <a:avLst/>
@@ -15216,7 +15216,7 @@
         <p:spPr>
           <a:xfrm>
             <a:off x="9051840" y="3245760"/>
-            <a:ext cx="656640" cy="289080"/>
+            <a:ext cx="656280" cy="288720"/>
           </a:xfrm>
           <a:prstGeom prst="rect">
             <a:avLst/>
@@ -15267,7 +15267,7 @@
         <p:spPr>
           <a:xfrm>
             <a:off x="9303840" y="2669760"/>
-            <a:ext cx="665640" cy="289080"/>
+            <a:ext cx="665280" cy="288720"/>
           </a:xfrm>
           <a:prstGeom prst="rect">
             <a:avLst/>
@@ -15318,7 +15318,7 @@
         <p:spPr>
           <a:xfrm>
             <a:off x="9015840" y="4613760"/>
-            <a:ext cx="763200" cy="289080"/>
+            <a:ext cx="762840" cy="288720"/>
           </a:xfrm>
           <a:prstGeom prst="rect">
             <a:avLst/>
@@ -15369,7 +15369,7 @@
         <p:spPr>
           <a:xfrm>
             <a:off x="9088200" y="5225760"/>
-            <a:ext cx="774000" cy="289080"/>
+            <a:ext cx="773640" cy="288720"/>
           </a:xfrm>
           <a:prstGeom prst="rect">
             <a:avLst/>
@@ -15420,7 +15420,7 @@
         <p:spPr>
           <a:xfrm>
             <a:off x="9268560" y="5837760"/>
-            <a:ext cx="783000" cy="289080"/>
+            <a:ext cx="782640" cy="288720"/>
           </a:xfrm>
           <a:prstGeom prst="rect">
             <a:avLst/>
@@ -15475,7 +15475,7 @@
         <p:spPr>
           <a:xfrm>
             <a:off x="936000" y="2660400"/>
-            <a:ext cx="1438920" cy="1438920"/>
+            <a:ext cx="1438560" cy="1438560"/>
           </a:xfrm>
           <a:prstGeom prst="rect">
             <a:avLst/>
@@ -15498,7 +15498,7 @@
         <p:spPr>
           <a:xfrm>
             <a:off x="1368000" y="2912400"/>
-            <a:ext cx="574920" cy="574920"/>
+            <a:ext cx="574560" cy="574560"/>
           </a:xfrm>
           <a:prstGeom prst="rect">
             <a:avLst/>
@@ -15547,7 +15547,7 @@
         <p:spPr>
           <a:xfrm>
             <a:off x="576000" y="4356000"/>
-            <a:ext cx="1726920" cy="1582920"/>
+            <a:ext cx="1726560" cy="1582560"/>
           </a:xfrm>
           <a:custGeom>
             <a:avLst/>
@@ -15749,7 +15749,7 @@
         <p:spPr>
           <a:xfrm>
             <a:off x="1116000" y="4968000"/>
-            <a:ext cx="574920" cy="574920"/>
+            <a:ext cx="574560" cy="574560"/>
           </a:xfrm>
           <a:prstGeom prst="can">
             <a:avLst>
@@ -15805,10 +15805,10 @@
         </p:nvGrpSpPr>
         <p:grpSpPr>
           <a:xfrm>
-            <a:off x="2132640" y="5167800"/>
-            <a:ext cx="650520" cy="592920"/>
-            <a:chOff x="2132640" y="5167800"/>
-            <a:chExt cx="650520" cy="592920"/>
+            <a:off x="2132640" y="5168160"/>
+            <a:ext cx="650160" cy="592560"/>
+            <a:chOff x="2132640" y="5168160"/>
+            <a:chExt cx="650160" cy="592560"/>
           </a:xfrm>
         </p:grpSpPr>
         <p:sp>
@@ -15819,8 +15819,8 @@
           </p:nvSpPr>
           <p:spPr>
             <a:xfrm rot="16200000">
-              <a:off x="1983240" y="5364720"/>
-              <a:ext cx="493920" cy="195120"/>
+              <a:off x="1983240" y="5365080"/>
+              <a:ext cx="493560" cy="194760"/>
             </a:xfrm>
             <a:prstGeom prst="rect">
               <a:avLst/>
@@ -15849,8 +15849,8 @@
           </p:nvSpPr>
           <p:spPr>
             <a:xfrm rot="16200000">
-              <a:off x="2193480" y="5171040"/>
-              <a:ext cx="592920" cy="586440"/>
+              <a:off x="2193480" y="5171400"/>
+              <a:ext cx="592560" cy="586080"/>
             </a:xfrm>
             <a:prstGeom prst="blockArc">
               <a:avLst>
@@ -15884,10 +15884,10 @@
         </p:nvGrpSpPr>
         <p:grpSpPr>
           <a:xfrm>
-            <a:off x="3794040" y="5103000"/>
-            <a:ext cx="394920" cy="574920"/>
-            <a:chOff x="3794040" y="5103000"/>
-            <a:chExt cx="394920" cy="574920"/>
+            <a:off x="3794040" y="5103360"/>
+            <a:ext cx="394560" cy="574560"/>
+            <a:chOff x="3794040" y="5103360"/>
+            <a:chExt cx="394560" cy="574560"/>
           </a:xfrm>
         </p:grpSpPr>
         <p:sp>
@@ -15898,8 +15898,8 @@
           </p:nvSpPr>
           <p:spPr>
             <a:xfrm rot="16200000">
-              <a:off x="3788280" y="5277240"/>
-              <a:ext cx="574920" cy="226080"/>
+              <a:off x="3788280" y="5277600"/>
+              <a:ext cx="574560" cy="225720"/>
             </a:xfrm>
             <a:prstGeom prst="rect">
               <a:avLst/>
@@ -15928,8 +15928,8 @@
           </p:nvSpPr>
           <p:spPr>
             <a:xfrm rot="16200000">
-              <a:off x="3792240" y="5279400"/>
-              <a:ext cx="229320" cy="226080"/>
+              <a:off x="3792240" y="5279760"/>
+              <a:ext cx="228960" cy="225720"/>
             </a:xfrm>
             <a:prstGeom prst="ellipse">
               <a:avLst/>
@@ -15989,8 +15989,8 @@
         </p:nvSpPr>
         <p:spPr>
           <a:xfrm rot="16200000">
-            <a:off x="1970280" y="5280120"/>
-            <a:ext cx="548280" cy="315000"/>
+            <a:off x="1970280" y="5280480"/>
+            <a:ext cx="547920" cy="314640"/>
           </a:xfrm>
           <a:prstGeom prst="rect">
             <a:avLst/>
@@ -16040,8 +16040,8 @@
         </p:nvSpPr>
         <p:spPr>
           <a:xfrm rot="5400000">
-            <a:off x="3813840" y="5267880"/>
-            <a:ext cx="548280" cy="315000"/>
+            <a:off x="3814200" y="5267880"/>
+            <a:ext cx="547920" cy="314640"/>
           </a:xfrm>
           <a:prstGeom prst="rect">
             <a:avLst/>
@@ -16096,7 +16096,7 @@
         <p:spPr>
           <a:xfrm>
             <a:off x="5616000" y="4284000"/>
-            <a:ext cx="548640" cy="548640"/>
+            <a:ext cx="548280" cy="548280"/>
           </a:xfrm>
           <a:prstGeom prst="rect">
             <a:avLst/>
@@ -16119,7 +16119,7 @@
         <p:spPr>
           <a:xfrm>
             <a:off x="5616000" y="4968000"/>
-            <a:ext cx="548640" cy="548640"/>
+            <a:ext cx="548280" cy="548280"/>
           </a:xfrm>
           <a:prstGeom prst="rect">
             <a:avLst/>

</xml_diff>